<commit_message>
update repo address in presentation
</commit_message>
<xml_diff>
--- a/container_presentation_lab-meeting.pptx
+++ b/container_presentation_lab-meeting.pptx
@@ -271,7 +271,7 @@
           <a:p>
             <a:fld id="{D11F5B16-AB79-FF4F-BBE7-B38D3D26C579}" type="datetimeFigureOut">
               <a:rPr lang="en-US" smtClean="0"/>
-              <a:t>10/28/24</a:t>
+              <a:t>10/29/24</a:t>
             </a:fld>
             <a:endParaRPr lang="en-US"/>
           </a:p>
@@ -469,7 +469,7 @@
           <a:p>
             <a:fld id="{D11F5B16-AB79-FF4F-BBE7-B38D3D26C579}" type="datetimeFigureOut">
               <a:rPr lang="en-US" smtClean="0"/>
-              <a:t>10/28/24</a:t>
+              <a:t>10/29/24</a:t>
             </a:fld>
             <a:endParaRPr lang="en-US"/>
           </a:p>
@@ -677,7 +677,7 @@
           <a:p>
             <a:fld id="{D11F5B16-AB79-FF4F-BBE7-B38D3D26C579}" type="datetimeFigureOut">
               <a:rPr lang="en-US" smtClean="0"/>
-              <a:t>10/28/24</a:t>
+              <a:t>10/29/24</a:t>
             </a:fld>
             <a:endParaRPr lang="en-US"/>
           </a:p>
@@ -875,7 +875,7 @@
           <a:p>
             <a:fld id="{D11F5B16-AB79-FF4F-BBE7-B38D3D26C579}" type="datetimeFigureOut">
               <a:rPr lang="en-US" smtClean="0"/>
-              <a:t>10/28/24</a:t>
+              <a:t>10/29/24</a:t>
             </a:fld>
             <a:endParaRPr lang="en-US"/>
           </a:p>
@@ -1150,7 +1150,7 @@
           <a:p>
             <a:fld id="{D11F5B16-AB79-FF4F-BBE7-B38D3D26C579}" type="datetimeFigureOut">
               <a:rPr lang="en-US" smtClean="0"/>
-              <a:t>10/28/24</a:t>
+              <a:t>10/29/24</a:t>
             </a:fld>
             <a:endParaRPr lang="en-US"/>
           </a:p>
@@ -1415,7 +1415,7 @@
           <a:p>
             <a:fld id="{D11F5B16-AB79-FF4F-BBE7-B38D3D26C579}" type="datetimeFigureOut">
               <a:rPr lang="en-US" smtClean="0"/>
-              <a:t>10/28/24</a:t>
+              <a:t>10/29/24</a:t>
             </a:fld>
             <a:endParaRPr lang="en-US"/>
           </a:p>
@@ -1827,7 +1827,7 @@
           <a:p>
             <a:fld id="{D11F5B16-AB79-FF4F-BBE7-B38D3D26C579}" type="datetimeFigureOut">
               <a:rPr lang="en-US" smtClean="0"/>
-              <a:t>10/28/24</a:t>
+              <a:t>10/29/24</a:t>
             </a:fld>
             <a:endParaRPr lang="en-US"/>
           </a:p>
@@ -1968,7 +1968,7 @@
           <a:p>
             <a:fld id="{D11F5B16-AB79-FF4F-BBE7-B38D3D26C579}" type="datetimeFigureOut">
               <a:rPr lang="en-US" smtClean="0"/>
-              <a:t>10/28/24</a:t>
+              <a:t>10/29/24</a:t>
             </a:fld>
             <a:endParaRPr lang="en-US"/>
           </a:p>
@@ -2081,7 +2081,7 @@
           <a:p>
             <a:fld id="{D11F5B16-AB79-FF4F-BBE7-B38D3D26C579}" type="datetimeFigureOut">
               <a:rPr lang="en-US" smtClean="0"/>
-              <a:t>10/28/24</a:t>
+              <a:t>10/29/24</a:t>
             </a:fld>
             <a:endParaRPr lang="en-US"/>
           </a:p>
@@ -2392,7 +2392,7 @@
           <a:p>
             <a:fld id="{D11F5B16-AB79-FF4F-BBE7-B38D3D26C579}" type="datetimeFigureOut">
               <a:rPr lang="en-US" smtClean="0"/>
-              <a:t>10/28/24</a:t>
+              <a:t>10/29/24</a:t>
             </a:fld>
             <a:endParaRPr lang="en-US"/>
           </a:p>
@@ -2680,7 +2680,7 @@
           <a:p>
             <a:fld id="{D11F5B16-AB79-FF4F-BBE7-B38D3D26C579}" type="datetimeFigureOut">
               <a:rPr lang="en-US" smtClean="0"/>
-              <a:t>10/28/24</a:t>
+              <a:t>10/29/24</a:t>
             </a:fld>
             <a:endParaRPr lang="en-US"/>
           </a:p>
@@ -2921,7 +2921,7 @@
           <a:p>
             <a:fld id="{D11F5B16-AB79-FF4F-BBE7-B38D3D26C579}" type="datetimeFigureOut">
               <a:rPr lang="en-US" smtClean="0"/>
-              <a:t>10/28/24</a:t>
+              <a:t>10/29/24</a:t>
             </a:fld>
             <a:endParaRPr lang="en-US"/>
           </a:p>
@@ -4330,7 +4330,7 @@
                 <a:ea typeface="Fira Code" pitchFamily="49" charset="0"/>
                 <a:cs typeface="Fira Code" pitchFamily="49" charset="0"/>
               </a:rPr>
-              <a:t>git clone </a:t>
+              <a:t>git clone https://</a:t>
             </a:r>
             <a:r>
               <a:rPr lang="en-US" sz="2400" dirty="0" err="1">
@@ -4346,23 +4346,7 @@
                 <a:ea typeface="Fira Code" pitchFamily="49" charset="0"/>
                 <a:cs typeface="Fira Code" pitchFamily="49" charset="0"/>
               </a:rPr>
-              <a:t>/</a:t>
-            </a:r>
-            <a:r>
-              <a:rPr lang="en-US" sz="2400" dirty="0" err="1">
-                <a:latin typeface="Fira Code" pitchFamily="49" charset="0"/>
-                <a:ea typeface="Fira Code" pitchFamily="49" charset="0"/>
-                <a:cs typeface="Fira Code" pitchFamily="49" charset="0"/>
-              </a:rPr>
-              <a:t>dchaimow</a:t>
-            </a:r>
-            <a:r>
-              <a:rPr lang="en-US" sz="2400" dirty="0">
-                <a:latin typeface="Fira Code" pitchFamily="49" charset="0"/>
-                <a:ea typeface="Fira Code" pitchFamily="49" charset="0"/>
-                <a:cs typeface="Fira Code" pitchFamily="49" charset="0"/>
-              </a:rPr>
-              <a:t>/intro-</a:t>
+              <a:t>/Cognitive-Neuroscience-Neurotechnology/intro-</a:t>
             </a:r>
             <a:r>
               <a:rPr lang="en-US" sz="2400" dirty="0" err="1">

</xml_diff>